<commit_message>
fix: ajuste no slide de apresentacao e termino da conclusão do trabalho
</commit_message>
<xml_diff>
--- a/apresentacao/Meetscan.pptx
+++ b/apresentacao/Meetscan.pptx
@@ -10,7 +10,7 @@
     <p:sldId id="259" r:id="rId4"/>
     <p:sldId id="261" r:id="rId5"/>
     <p:sldId id="262" r:id="rId6"/>
-    <p:sldId id="258" r:id="rId7"/>
+    <p:sldId id="263" r:id="rId7"/>
     <p:sldId id="260" r:id="rId8"/>
   </p:sldIdLst>
   <p:sldSz cx="12192000" cy="6858000"/>
@@ -110,6 +110,11 @@
       </a:defRPr>
     </a:lvl9pPr>
   </p:defaultTextStyle>
+  <p:extLst>
+    <p:ext uri="{EFAFB233-063F-42B5-8137-9DF3F51BA10A}">
+      <p15:sldGuideLst xmlns:p15="http://schemas.microsoft.com/office/powerpoint/2012/main"/>
+    </p:ext>
+  </p:extLst>
 </p:presentation>
 </file>
 
@@ -516,7 +521,7 @@
           <a:p>
             <a:fld id="{08A8DB17-AA2F-4756-85B9-D2F6AB579BE1}" type="datetimeFigureOut">
               <a:rPr lang="pt-BR" smtClean="0"/>
-              <a:t>03/06/2024</a:t>
+              <a:t>04/06/2024</a:t>
             </a:fld>
             <a:endParaRPr lang="pt-BR"/>
           </a:p>
@@ -695,7 +700,7 @@
           <a:p>
             <a:fld id="{08A8DB17-AA2F-4756-85B9-D2F6AB579BE1}" type="datetimeFigureOut">
               <a:rPr lang="pt-BR" smtClean="0"/>
-              <a:t>03/06/2024</a:t>
+              <a:t>04/06/2024</a:t>
             </a:fld>
             <a:endParaRPr lang="pt-BR"/>
           </a:p>
@@ -875,7 +880,7 @@
           <a:p>
             <a:fld id="{08A8DB17-AA2F-4756-85B9-D2F6AB579BE1}" type="datetimeFigureOut">
               <a:rPr lang="pt-BR" smtClean="0"/>
-              <a:t>03/06/2024</a:t>
+              <a:t>04/06/2024</a:t>
             </a:fld>
             <a:endParaRPr lang="pt-BR"/>
           </a:p>
@@ -1045,7 +1050,7 @@
           <a:p>
             <a:fld id="{08A8DB17-AA2F-4756-85B9-D2F6AB579BE1}" type="datetimeFigureOut">
               <a:rPr lang="pt-BR" smtClean="0"/>
-              <a:t>03/06/2024</a:t>
+              <a:t>04/06/2024</a:t>
             </a:fld>
             <a:endParaRPr lang="pt-BR"/>
           </a:p>
@@ -1358,7 +1363,7 @@
           <a:p>
             <a:fld id="{08A8DB17-AA2F-4756-85B9-D2F6AB579BE1}" type="datetimeFigureOut">
               <a:rPr lang="pt-BR" smtClean="0"/>
-              <a:t>03/06/2024</a:t>
+              <a:t>04/06/2024</a:t>
             </a:fld>
             <a:endParaRPr lang="pt-BR"/>
           </a:p>
@@ -1744,7 +1749,7 @@
           <a:p>
             <a:fld id="{08A8DB17-AA2F-4756-85B9-D2F6AB579BE1}" type="datetimeFigureOut">
               <a:rPr lang="pt-BR" smtClean="0"/>
-              <a:t>03/06/2024</a:t>
+              <a:t>04/06/2024</a:t>
             </a:fld>
             <a:endParaRPr lang="pt-BR"/>
           </a:p>
@@ -2178,7 +2183,7 @@
           <a:p>
             <a:fld id="{08A8DB17-AA2F-4756-85B9-D2F6AB579BE1}" type="datetimeFigureOut">
               <a:rPr lang="pt-BR" smtClean="0"/>
-              <a:t>03/06/2024</a:t>
+              <a:t>04/06/2024</a:t>
             </a:fld>
             <a:endParaRPr lang="pt-BR"/>
           </a:p>
@@ -2296,7 +2301,7 @@
           <a:p>
             <a:fld id="{08A8DB17-AA2F-4756-85B9-D2F6AB579BE1}" type="datetimeFigureOut">
               <a:rPr lang="pt-BR" smtClean="0"/>
-              <a:t>03/06/2024</a:t>
+              <a:t>04/06/2024</a:t>
             </a:fld>
             <a:endParaRPr lang="pt-BR"/>
           </a:p>
@@ -2391,7 +2396,7 @@
           <a:p>
             <a:fld id="{08A8DB17-AA2F-4756-85B9-D2F6AB579BE1}" type="datetimeFigureOut">
               <a:rPr lang="pt-BR" smtClean="0"/>
-              <a:t>03/06/2024</a:t>
+              <a:t>04/06/2024</a:t>
             </a:fld>
             <a:endParaRPr lang="pt-BR"/>
           </a:p>
@@ -2741,7 +2746,7 @@
           <a:p>
             <a:fld id="{08A8DB17-AA2F-4756-85B9-D2F6AB579BE1}" type="datetimeFigureOut">
               <a:rPr lang="pt-BR" smtClean="0"/>
-              <a:t>03/06/2024</a:t>
+              <a:t>04/06/2024</a:t>
             </a:fld>
             <a:endParaRPr lang="pt-BR"/>
           </a:p>
@@ -3166,7 +3171,7 @@
           <a:p>
             <a:fld id="{08A8DB17-AA2F-4756-85B9-D2F6AB579BE1}" type="datetimeFigureOut">
               <a:rPr lang="pt-BR" smtClean="0"/>
-              <a:t>03/06/2024</a:t>
+              <a:t>04/06/2024</a:t>
             </a:fld>
             <a:endParaRPr lang="pt-BR"/>
           </a:p>
@@ -3447,7 +3452,7 @@
           <a:p>
             <a:fld id="{08A8DB17-AA2F-4756-85B9-D2F6AB579BE1}" type="datetimeFigureOut">
               <a:rPr lang="pt-BR" smtClean="0"/>
-              <a:t>03/06/2024</a:t>
+              <a:t>04/06/2024</a:t>
             </a:fld>
             <a:endParaRPr lang="pt-BR"/>
           </a:p>
@@ -4292,7 +4297,7 @@
         </p:blipFill>
         <p:spPr>
           <a:xfrm>
-            <a:off x="7266828" y="4812570"/>
+            <a:off x="571571" y="5399832"/>
             <a:ext cx="3099822" cy="813818"/>
           </a:xfrm>
         </p:spPr>
@@ -4319,7 +4324,7 @@
         </p:blipFill>
         <p:spPr>
           <a:xfrm>
-            <a:off x="1063752" y="4547702"/>
+            <a:off x="7236878" y="5134963"/>
             <a:ext cx="2976043" cy="1343554"/>
           </a:xfrm>
           <a:prstGeom prst="rect">
@@ -4439,8 +4444,8 @@
         </p:blipFill>
         <p:spPr bwMode="auto">
           <a:xfrm>
-            <a:off x="4467277" y="1978418"/>
-            <a:ext cx="1676400" cy="1133475"/>
+            <a:off x="4294226" y="1859782"/>
+            <a:ext cx="2027326" cy="1370749"/>
           </a:xfrm>
           <a:prstGeom prst="rect">
             <a:avLst/>
@@ -4485,7 +4490,7 @@
         </p:blipFill>
         <p:spPr>
           <a:xfrm>
-            <a:off x="4568622" y="4605679"/>
+            <a:off x="4568622" y="5069887"/>
             <a:ext cx="1473707" cy="1473707"/>
           </a:xfrm>
           <a:prstGeom prst="rect">
@@ -4515,7 +4520,7 @@
         </p:blipFill>
         <p:spPr>
           <a:xfrm>
-            <a:off x="4594598" y="3263060"/>
+            <a:off x="4594598" y="3587762"/>
             <a:ext cx="1421757" cy="1133475"/>
           </a:xfrm>
           <a:prstGeom prst="rect">
@@ -4657,6 +4662,53 @@
           </a:prstGeom>
         </p:spPr>
       </p:pic>
+      <p:pic>
+        <p:nvPicPr>
+          <p:cNvPr id="1026" name="Picture 2">
+            <a:extLst>
+              <a:ext uri="{FF2B5EF4-FFF2-40B4-BE49-F238E27FC236}">
+                <a16:creationId xmlns:a16="http://schemas.microsoft.com/office/drawing/2014/main" id="{62C12F4F-AC54-4A21-E138-8978C88317FD}"/>
+              </a:ext>
+            </a:extLst>
+          </p:cNvPr>
+          <p:cNvPicPr>
+            <a:picLocks noChangeAspect="1" noChangeArrowheads="1"/>
+          </p:cNvPicPr>
+          <p:nvPr/>
+        </p:nvPicPr>
+        <p:blipFill>
+          <a:blip r:embed="rId4">
+            <a:extLst>
+              <a:ext uri="{28A0092B-C50C-407E-A947-70E740481C1C}">
+                <a14:useLocalDpi xmlns:a14="http://schemas.microsoft.com/office/drawing/2010/main" val="0"/>
+              </a:ext>
+            </a:extLst>
+          </a:blip>
+          <a:srcRect/>
+          <a:stretch>
+            <a:fillRect/>
+          </a:stretch>
+        </p:blipFill>
+        <p:spPr bwMode="auto">
+          <a:xfrm>
+            <a:off x="4357146" y="4518212"/>
+            <a:ext cx="1899118" cy="2134839"/>
+          </a:xfrm>
+          <a:prstGeom prst="rect">
+            <a:avLst/>
+          </a:prstGeom>
+          <a:noFill/>
+          <a:extLst>
+            <a:ext uri="{909E8E84-426E-40DD-AFC4-6F175D3DCCD1}">
+              <a14:hiddenFill xmlns:a14="http://schemas.microsoft.com/office/drawing/2010/main">
+                <a:solidFill>
+                  <a:srgbClr val="FFFFFF"/>
+                </a:solidFill>
+              </a14:hiddenFill>
+            </a:ext>
+          </a:extLst>
+        </p:spPr>
+      </p:pic>
     </p:spTree>
     <p:extLst>
       <p:ext uri="{BB962C8B-B14F-4D97-AF65-F5344CB8AC3E}">
@@ -4744,8 +4796,55 @@
         </p:blipFill>
         <p:spPr bwMode="auto">
           <a:xfrm>
-            <a:off x="1063752" y="1978120"/>
+            <a:off x="908859" y="2790965"/>
             <a:ext cx="3777922" cy="1276070"/>
+          </a:xfrm>
+          <a:prstGeom prst="rect">
+            <a:avLst/>
+          </a:prstGeom>
+          <a:noFill/>
+          <a:extLst>
+            <a:ext uri="{909E8E84-426E-40DD-AFC4-6F175D3DCCD1}">
+              <a14:hiddenFill xmlns:a14="http://schemas.microsoft.com/office/drawing/2010/main">
+                <a:solidFill>
+                  <a:srgbClr val="FFFFFF"/>
+                </a:solidFill>
+              </a14:hiddenFill>
+            </a:ext>
+          </a:extLst>
+        </p:spPr>
+      </p:pic>
+      <p:pic>
+        <p:nvPicPr>
+          <p:cNvPr id="3" name="Picture 2">
+            <a:extLst>
+              <a:ext uri="{FF2B5EF4-FFF2-40B4-BE49-F238E27FC236}">
+                <a16:creationId xmlns:a16="http://schemas.microsoft.com/office/drawing/2014/main" id="{CE20B765-7726-6CD3-EFB9-F918DA6D52A7}"/>
+              </a:ext>
+            </a:extLst>
+          </p:cNvPr>
+          <p:cNvPicPr>
+            <a:picLocks noChangeAspect="1" noChangeArrowheads="1"/>
+          </p:cNvPicPr>
+          <p:nvPr/>
+        </p:nvPicPr>
+        <p:blipFill>
+          <a:blip r:embed="rId3">
+            <a:extLst>
+              <a:ext uri="{28A0092B-C50C-407E-A947-70E740481C1C}">
+                <a14:useLocalDpi xmlns:a14="http://schemas.microsoft.com/office/drawing/2010/main" val="0"/>
+              </a:ext>
+            </a:extLst>
+          </a:blip>
+          <a:srcRect/>
+          <a:stretch>
+            <a:fillRect/>
+          </a:stretch>
+        </p:blipFill>
+        <p:spPr bwMode="auto">
+          <a:xfrm>
+            <a:off x="7192887" y="2000155"/>
+            <a:ext cx="2164717" cy="2857690"/>
           </a:xfrm>
           <a:prstGeom prst="rect">
             <a:avLst/>
@@ -4797,7 +4896,7 @@
           <p:cNvPr id="2" name="Título 1">
             <a:extLst>
               <a:ext uri="{FF2B5EF4-FFF2-40B4-BE49-F238E27FC236}">
-                <a16:creationId xmlns:a16="http://schemas.microsoft.com/office/drawing/2014/main" id="{4FD0D10D-CE32-AE5F-0507-FE0E7F3205A9}"/>
+                <a16:creationId xmlns:a16="http://schemas.microsoft.com/office/drawing/2014/main" id="{EB922CBB-19B8-3B8B-13E0-6482207C6D20}"/>
               </a:ext>
             </a:extLst>
           </p:cNvPr>
@@ -4814,9 +4913,10 @@
           <a:lstStyle/>
           <a:p>
             <a:r>
-              <a:rPr lang="pt-BR" dirty="0"/>
-              <a:t>Tecnologias empregadas no desenvolvimento</a:t>
-            </a:r>
+              <a:rPr lang="pt-BR" dirty="0" err="1"/>
+              <a:t>Conclusao</a:t>
+            </a:r>
+            <a:endParaRPr lang="pt-BR" dirty="0"/>
           </a:p>
         </p:txBody>
       </p:sp>
@@ -4825,7 +4925,7 @@
           <p:cNvPr id="3" name="Espaço Reservado para Conteúdo 2">
             <a:extLst>
               <a:ext uri="{FF2B5EF4-FFF2-40B4-BE49-F238E27FC236}">
-                <a16:creationId xmlns:a16="http://schemas.microsoft.com/office/drawing/2014/main" id="{92FE7A2D-8F5B-FFDC-CF93-B7E64A8B2855}"/>
+                <a16:creationId xmlns:a16="http://schemas.microsoft.com/office/drawing/2014/main" id="{6694F3F9-D532-1157-A845-E67708B541D9}"/>
               </a:ext>
             </a:extLst>
           </p:cNvPr>
@@ -4841,77 +4941,14 @@
           <a:bodyPr/>
           <a:lstStyle/>
           <a:p>
-            <a:r>
-              <a:rPr lang="pt-BR" dirty="0"/>
-              <a:t>Para o desenvolvimento da parte WEB foram utilizadas as tecnologias PHP, Laravel, </a:t>
-            </a:r>
-            <a:r>
-              <a:rPr lang="pt-BR" dirty="0" err="1"/>
-              <a:t>Jquery</a:t>
-            </a:r>
-            <a:r>
-              <a:rPr lang="pt-BR" dirty="0"/>
-              <a:t>, HTML, </a:t>
-            </a:r>
-            <a:r>
-              <a:rPr lang="pt-BR" dirty="0" err="1"/>
-              <a:t>Bootstrap</a:t>
-            </a:r>
-            <a:r>
-              <a:rPr lang="pt-BR" dirty="0"/>
-              <a:t>, </a:t>
-            </a:r>
-            <a:r>
-              <a:rPr lang="pt-BR" dirty="0" err="1"/>
-              <a:t>Mysql</a:t>
-            </a:r>
-            <a:r>
-              <a:rPr lang="pt-BR" dirty="0"/>
-              <a:t>, API do telegram;</a:t>
-            </a:r>
-          </a:p>
-          <a:p>
-            <a:r>
-              <a:rPr lang="pt-BR" dirty="0"/>
-              <a:t>Para o desenvolvimento da parte de IoT foram utilizadas a placa </a:t>
-            </a:r>
-            <a:r>
-              <a:rPr lang="pt-BR" dirty="0" err="1"/>
-              <a:t>NodeMcu</a:t>
-            </a:r>
-            <a:r>
-              <a:rPr lang="pt-BR" dirty="0"/>
-              <a:t> ESP8266 em conjunto a IDE da plataforma Arduino para compilação de código C++ para o microcontrolador.</a:t>
-            </a:r>
-          </a:p>
-          <a:p>
-            <a:r>
-              <a:rPr lang="pt-BR" dirty="0"/>
-              <a:t>Para o desenvolvimento do reconhecimento facial forma utilizadas as tecnologias Python, </a:t>
-            </a:r>
-            <a:r>
-              <a:rPr lang="pt-BR" dirty="0" err="1"/>
-              <a:t>OpenCV</a:t>
-            </a:r>
-            <a:r>
-              <a:rPr lang="pt-BR" dirty="0"/>
-              <a:t> Python e </a:t>
-            </a:r>
-            <a:r>
-              <a:rPr lang="pt-BR" dirty="0" err="1"/>
-              <a:t>Facerecognition</a:t>
-            </a:r>
-            <a:r>
-              <a:rPr lang="pt-BR" dirty="0"/>
-              <a:t>.</a:t>
-            </a:r>
+            <a:endParaRPr lang="pt-BR"/>
           </a:p>
         </p:txBody>
       </p:sp>
     </p:spTree>
     <p:extLst>
       <p:ext uri="{BB962C8B-B14F-4D97-AF65-F5344CB8AC3E}">
-        <p14:creationId xmlns:p14="http://schemas.microsoft.com/office/powerpoint/2010/main" val="1111177211"/>
+        <p14:creationId xmlns:p14="http://schemas.microsoft.com/office/powerpoint/2010/main" val="879082288"/>
       </p:ext>
     </p:extLst>
   </p:cSld>
@@ -4985,7 +5022,7 @@
         <p:spPr/>
         <p:txBody>
           <a:bodyPr>
-            <a:normAutofit fontScale="85000" lnSpcReduction="10000"/>
+            <a:normAutofit fontScale="85000" lnSpcReduction="20000"/>
           </a:bodyPr>
           <a:lstStyle/>
           <a:p>
@@ -5023,39 +5060,31 @@
           <a:p>
             <a:r>
               <a:rPr lang="pt-BR" dirty="0"/>
-              <a:t>FLATICON. HTML </a:t>
-            </a:r>
-            <a:r>
-              <a:rPr lang="pt-BR" dirty="0" err="1"/>
-              <a:t>Icon</a:t>
-            </a:r>
-            <a:r>
-              <a:rPr lang="pt-BR" dirty="0"/>
-              <a:t>. Disponível em: &lt;</a:t>
+              <a:t>C++. C++ Logo. Disponível em: &lt;</a:t>
             </a:r>
             <a:r>
               <a:rPr lang="pt-BR" dirty="0" err="1">
                 <a:hlinkClick r:id="rId3"/>
               </a:rPr>
-              <a:t>Html</a:t>
+              <a:t>isocpp</a:t>
             </a:r>
             <a:r>
               <a:rPr lang="pt-BR" dirty="0">
                 <a:hlinkClick r:id="rId3"/>
               </a:rPr>
-              <a:t> 5 - Free social media </a:t>
+              <a:t>/logos: C++ logos </a:t>
             </a:r>
             <a:r>
               <a:rPr lang="pt-BR" dirty="0" err="1">
                 <a:hlinkClick r:id="rId3"/>
               </a:rPr>
-              <a:t>icons</a:t>
+              <a:t>created</a:t>
             </a:r>
             <a:r>
               <a:rPr lang="pt-BR" dirty="0">
                 <a:hlinkClick r:id="rId3"/>
               </a:rPr>
-              <a:t> (flaticon.com)</a:t>
+              <a:t> for isocpp.org (github.com)</a:t>
             </a:r>
             <a:r>
               <a:rPr lang="pt-BR" dirty="0"/>
@@ -5065,7 +5094,7 @@
           <a:p>
             <a:r>
               <a:rPr lang="pt-BR" dirty="0"/>
-              <a:t>FLATICON. TELEGRAM </a:t>
+              <a:t>FLATICON. HTML </a:t>
             </a:r>
             <a:r>
               <a:rPr lang="pt-BR" dirty="0" err="1"/>
@@ -5074,30 +5103,24 @@
             <a:r>
               <a:rPr lang="pt-BR" dirty="0"/>
               <a:t>. Disponível em: &lt;</a:t>
+            </a:r>
+            <a:r>
+              <a:rPr lang="pt-BR" dirty="0" err="1">
+                <a:hlinkClick r:id="rId4"/>
+              </a:rPr>
+              <a:t>Html</a:t>
             </a:r>
             <a:r>
               <a:rPr lang="pt-BR" dirty="0">
                 <a:hlinkClick r:id="rId4"/>
               </a:rPr>
-              <a:t>Telegram </a:t>
+              <a:t> 5 - Free social media </a:t>
             </a:r>
             <a:r>
               <a:rPr lang="pt-BR" dirty="0" err="1">
                 <a:hlinkClick r:id="rId4"/>
               </a:rPr>
-              <a:t>Icons</a:t>
-            </a:r>
-            <a:r>
-              <a:rPr lang="pt-BR" dirty="0">
-                <a:hlinkClick r:id="rId4"/>
-              </a:rPr>
-              <a:t> &amp; </a:t>
-            </a:r>
-            <a:r>
-              <a:rPr lang="pt-BR" dirty="0" err="1">
-                <a:hlinkClick r:id="rId4"/>
-              </a:rPr>
-              <a:t>Symbols</a:t>
+              <a:t>icons</a:t>
             </a:r>
             <a:r>
               <a:rPr lang="pt-BR" dirty="0">
@@ -5113,39 +5136,45 @@
           <a:p>
             <a:r>
               <a:rPr lang="pt-BR" dirty="0"/>
-              <a:t>JQUERY. </a:t>
+              <a:t>FLATICON. TELEGRAM </a:t>
             </a:r>
             <a:r>
               <a:rPr lang="pt-BR" dirty="0" err="1"/>
-              <a:t>Jquery</a:t>
+              <a:t>Icon</a:t>
             </a:r>
             <a:r>
               <a:rPr lang="pt-BR" dirty="0"/>
-              <a:t> brand. Disponível em: &lt;</a:t>
+              <a:t>. Disponível em: &lt;</a:t>
             </a:r>
             <a:r>
               <a:rPr lang="pt-BR" dirty="0">
                 <a:hlinkClick r:id="rId5"/>
               </a:rPr>
-              <a:t>Logos | </a:t>
+              <a:t>Telegram </a:t>
             </a:r>
             <a:r>
               <a:rPr lang="pt-BR" dirty="0" err="1">
                 <a:hlinkClick r:id="rId5"/>
               </a:rPr>
-              <a:t>jQuery</a:t>
+              <a:t>Icons</a:t>
             </a:r>
             <a:r>
               <a:rPr lang="pt-BR" dirty="0">
                 <a:hlinkClick r:id="rId5"/>
               </a:rPr>
-              <a:t> Brand </a:t>
+              <a:t> &amp; </a:t>
             </a:r>
             <a:r>
               <a:rPr lang="pt-BR" dirty="0" err="1">
                 <a:hlinkClick r:id="rId5"/>
               </a:rPr>
-              <a:t>Guidelines</a:t>
+              <a:t>Symbols</a:t>
+            </a:r>
+            <a:r>
+              <a:rPr lang="pt-BR" dirty="0">
+                <a:hlinkClick r:id="rId5"/>
+              </a:rPr>
+              <a:t> (flaticon.com)</a:t>
             </a:r>
             <a:r>
               <a:rPr lang="pt-BR" dirty="0"/>
@@ -5155,13 +5184,39 @@
           <a:p>
             <a:r>
               <a:rPr lang="pt-BR" dirty="0"/>
-              <a:t>Laravel. Laravel. Disponível em: &lt;</a:t>
-            </a:r>
-            <a:r>
-              <a:rPr lang="en-US" dirty="0">
+              <a:t>JQUERY. </a:t>
+            </a:r>
+            <a:r>
+              <a:rPr lang="pt-BR" dirty="0" err="1"/>
+              <a:t>Jquery</a:t>
+            </a:r>
+            <a:r>
+              <a:rPr lang="pt-BR" dirty="0"/>
+              <a:t> brand. Disponível em: &lt;</a:t>
+            </a:r>
+            <a:r>
+              <a:rPr lang="pt-BR" dirty="0">
                 <a:hlinkClick r:id="rId6"/>
               </a:rPr>
-              <a:t>Laravel - The PHP Framework For Web Artisans</a:t>
+              <a:t>Logos | </a:t>
+            </a:r>
+            <a:r>
+              <a:rPr lang="pt-BR" dirty="0" err="1">
+                <a:hlinkClick r:id="rId6"/>
+              </a:rPr>
+              <a:t>jQuery</a:t>
+            </a:r>
+            <a:r>
+              <a:rPr lang="pt-BR" dirty="0">
+                <a:hlinkClick r:id="rId6"/>
+              </a:rPr>
+              <a:t> Brand </a:t>
+            </a:r>
+            <a:r>
+              <a:rPr lang="pt-BR" dirty="0" err="1">
+                <a:hlinkClick r:id="rId6"/>
+              </a:rPr>
+              <a:t>Guidelines</a:t>
             </a:r>
             <a:r>
               <a:rPr lang="pt-BR" dirty="0"/>
@@ -5171,13 +5226,13 @@
           <a:p>
             <a:r>
               <a:rPr lang="pt-BR" dirty="0"/>
-              <a:t>MYSQL. MySQL logo. Disponível em: &lt;</a:t>
-            </a:r>
-            <a:r>
-              <a:rPr lang="pt-BR" dirty="0">
+              <a:t>Laravel. Laravel. Disponível em: &lt;</a:t>
+            </a:r>
+            <a:r>
+              <a:rPr lang="en-US" dirty="0">
                 <a:hlinkClick r:id="rId7"/>
               </a:rPr>
-              <a:t>MySQL :: MySQL Logo Downloads</a:t>
+              <a:t>Laravel - The PHP Framework For Web Artisans</a:t>
             </a:r>
             <a:r>
               <a:rPr lang="pt-BR" dirty="0"/>
@@ -5187,13 +5242,13 @@
           <a:p>
             <a:r>
               <a:rPr lang="pt-BR" dirty="0"/>
-              <a:t>PHP. PHP logos. Disponível em: &lt;</a:t>
+              <a:t>MYSQL. MySQL logo. Disponível em: &lt;</a:t>
             </a:r>
             <a:r>
               <a:rPr lang="pt-BR" dirty="0">
                 <a:hlinkClick r:id="rId8"/>
               </a:rPr>
-              <a:t>PHP: Download Logos</a:t>
+              <a:t>MySQL :: MySQL Logo Downloads</a:t>
             </a:r>
             <a:r>
               <a:rPr lang="pt-BR" dirty="0"/>
@@ -5203,13 +5258,13 @@
           <a:p>
             <a:r>
               <a:rPr lang="pt-BR" dirty="0"/>
-              <a:t>PYTHON. Python logo. Disponível em: &lt;</a:t>
-            </a:r>
-            <a:r>
-              <a:rPr lang="en-US" dirty="0">
+              <a:t>PHP. PHP logos. Disponível em: &lt;</a:t>
+            </a:r>
+            <a:r>
+              <a:rPr lang="pt-BR" dirty="0">
                 <a:hlinkClick r:id="rId9"/>
               </a:rPr>
-              <a:t>The Python Logo | Python Software Foundation</a:t>
+              <a:t>PHP: Download Logos</a:t>
             </a:r>
             <a:r>
               <a:rPr lang="pt-BR" dirty="0"/>
@@ -5217,7 +5272,20 @@
             </a:r>
           </a:p>
           <a:p>
-            <a:endParaRPr lang="pt-BR" dirty="0"/>
+            <a:r>
+              <a:rPr lang="pt-BR" dirty="0"/>
+              <a:t>PYTHON. Python logo. Disponível em: &lt;</a:t>
+            </a:r>
+            <a:r>
+              <a:rPr lang="en-US" dirty="0">
+                <a:hlinkClick r:id="rId10"/>
+              </a:rPr>
+              <a:t>The Python Logo | Python Software Foundation</a:t>
+            </a:r>
+            <a:r>
+              <a:rPr lang="pt-BR" dirty="0"/>
+              <a:t>&gt;. Acesso em: jun. 2024.</a:t>
+            </a:r>
           </a:p>
         </p:txBody>
       </p:sp>

</xml_diff>

<commit_message>
fix: termino dos slides para apresentação, ajustes gerais no documento do TCC
</commit_message>
<xml_diff>
--- a/apresentacao/Meetscan.pptx
+++ b/apresentacao/Meetscan.pptx
@@ -521,7 +521,7 @@
           <a:p>
             <a:fld id="{08A8DB17-AA2F-4756-85B9-D2F6AB579BE1}" type="datetimeFigureOut">
               <a:rPr lang="pt-BR" smtClean="0"/>
-              <a:t>04/06/2024</a:t>
+              <a:t>05/06/2024</a:t>
             </a:fld>
             <a:endParaRPr lang="pt-BR"/>
           </a:p>
@@ -700,7 +700,7 @@
           <a:p>
             <a:fld id="{08A8DB17-AA2F-4756-85B9-D2F6AB579BE1}" type="datetimeFigureOut">
               <a:rPr lang="pt-BR" smtClean="0"/>
-              <a:t>04/06/2024</a:t>
+              <a:t>05/06/2024</a:t>
             </a:fld>
             <a:endParaRPr lang="pt-BR"/>
           </a:p>
@@ -880,7 +880,7 @@
           <a:p>
             <a:fld id="{08A8DB17-AA2F-4756-85B9-D2F6AB579BE1}" type="datetimeFigureOut">
               <a:rPr lang="pt-BR" smtClean="0"/>
-              <a:t>04/06/2024</a:t>
+              <a:t>05/06/2024</a:t>
             </a:fld>
             <a:endParaRPr lang="pt-BR"/>
           </a:p>
@@ -1050,7 +1050,7 @@
           <a:p>
             <a:fld id="{08A8DB17-AA2F-4756-85B9-D2F6AB579BE1}" type="datetimeFigureOut">
               <a:rPr lang="pt-BR" smtClean="0"/>
-              <a:t>04/06/2024</a:t>
+              <a:t>05/06/2024</a:t>
             </a:fld>
             <a:endParaRPr lang="pt-BR"/>
           </a:p>
@@ -1363,7 +1363,7 @@
           <a:p>
             <a:fld id="{08A8DB17-AA2F-4756-85B9-D2F6AB579BE1}" type="datetimeFigureOut">
               <a:rPr lang="pt-BR" smtClean="0"/>
-              <a:t>04/06/2024</a:t>
+              <a:t>05/06/2024</a:t>
             </a:fld>
             <a:endParaRPr lang="pt-BR"/>
           </a:p>
@@ -1749,7 +1749,7 @@
           <a:p>
             <a:fld id="{08A8DB17-AA2F-4756-85B9-D2F6AB579BE1}" type="datetimeFigureOut">
               <a:rPr lang="pt-BR" smtClean="0"/>
-              <a:t>04/06/2024</a:t>
+              <a:t>05/06/2024</a:t>
             </a:fld>
             <a:endParaRPr lang="pt-BR"/>
           </a:p>
@@ -2183,7 +2183,7 @@
           <a:p>
             <a:fld id="{08A8DB17-AA2F-4756-85B9-D2F6AB579BE1}" type="datetimeFigureOut">
               <a:rPr lang="pt-BR" smtClean="0"/>
-              <a:t>04/06/2024</a:t>
+              <a:t>05/06/2024</a:t>
             </a:fld>
             <a:endParaRPr lang="pt-BR"/>
           </a:p>
@@ -2301,7 +2301,7 @@
           <a:p>
             <a:fld id="{08A8DB17-AA2F-4756-85B9-D2F6AB579BE1}" type="datetimeFigureOut">
               <a:rPr lang="pt-BR" smtClean="0"/>
-              <a:t>04/06/2024</a:t>
+              <a:t>05/06/2024</a:t>
             </a:fld>
             <a:endParaRPr lang="pt-BR"/>
           </a:p>
@@ -2396,7 +2396,7 @@
           <a:p>
             <a:fld id="{08A8DB17-AA2F-4756-85B9-D2F6AB579BE1}" type="datetimeFigureOut">
               <a:rPr lang="pt-BR" smtClean="0"/>
-              <a:t>04/06/2024</a:t>
+              <a:t>05/06/2024</a:t>
             </a:fld>
             <a:endParaRPr lang="pt-BR"/>
           </a:p>
@@ -2746,7 +2746,7 @@
           <a:p>
             <a:fld id="{08A8DB17-AA2F-4756-85B9-D2F6AB579BE1}" type="datetimeFigureOut">
               <a:rPr lang="pt-BR" smtClean="0"/>
-              <a:t>04/06/2024</a:t>
+              <a:t>05/06/2024</a:t>
             </a:fld>
             <a:endParaRPr lang="pt-BR"/>
           </a:p>
@@ -3171,7 +3171,7 @@
           <a:p>
             <a:fld id="{08A8DB17-AA2F-4756-85B9-D2F6AB579BE1}" type="datetimeFigureOut">
               <a:rPr lang="pt-BR" smtClean="0"/>
-              <a:t>04/06/2024</a:t>
+              <a:t>05/06/2024</a:t>
             </a:fld>
             <a:endParaRPr lang="pt-BR"/>
           </a:p>
@@ -3452,7 +3452,7 @@
           <a:p>
             <a:fld id="{08A8DB17-AA2F-4756-85B9-D2F6AB579BE1}" type="datetimeFigureOut">
               <a:rPr lang="pt-BR" smtClean="0"/>
-              <a:t>04/06/2024</a:t>
+              <a:t>05/06/2024</a:t>
             </a:fld>
             <a:endParaRPr lang="pt-BR"/>
           </a:p>
@@ -4257,12 +4257,8 @@
           <a:lstStyle/>
           <a:p>
             <a:r>
-              <a:rPr lang="pt-BR" dirty="0" err="1"/>
-              <a:t>Tecnolgias</a:t>
-            </a:r>
-            <a:r>
               <a:rPr lang="pt-BR" dirty="0"/>
-              <a:t> na parte web</a:t>
+              <a:t>Tecnologias na parte web</a:t>
             </a:r>
           </a:p>
         </p:txBody>
@@ -4528,6 +4524,36 @@
           </a:prstGeom>
         </p:spPr>
       </p:pic>
+      <p:pic>
+        <p:nvPicPr>
+          <p:cNvPr id="3" name="Imagem 2">
+            <a:extLst>
+              <a:ext uri="{FF2B5EF4-FFF2-40B4-BE49-F238E27FC236}">
+                <a16:creationId xmlns:a16="http://schemas.microsoft.com/office/drawing/2014/main" id="{8C126D49-7D7F-2315-6FE7-2331D3D90D4A}"/>
+              </a:ext>
+            </a:extLst>
+          </p:cNvPr>
+          <p:cNvPicPr>
+            <a:picLocks noChangeAspect="1"/>
+          </p:cNvPicPr>
+          <p:nvPr/>
+        </p:nvPicPr>
+        <p:blipFill>
+          <a:blip r:embed="rId9"/>
+          <a:stretch>
+            <a:fillRect/>
+          </a:stretch>
+        </p:blipFill>
+        <p:spPr>
+          <a:xfrm>
+            <a:off x="7798874" y="3587762"/>
+            <a:ext cx="1852049" cy="1370749"/>
+          </a:xfrm>
+          <a:prstGeom prst="rect">
+            <a:avLst/>
+          </a:prstGeom>
+        </p:spPr>
+      </p:pic>
     </p:spTree>
     <p:extLst>
       <p:ext uri="{BB962C8B-B14F-4D97-AF65-F5344CB8AC3E}">
@@ -4913,10 +4939,9 @@
           <a:lstStyle/>
           <a:p>
             <a:r>
-              <a:rPr lang="pt-BR" dirty="0" err="1"/>
-              <a:t>Conclusao</a:t>
-            </a:r>
-            <a:endParaRPr lang="pt-BR" dirty="0"/>
+              <a:rPr lang="pt-BR" dirty="0"/>
+              <a:t>Conclusão</a:t>
+            </a:r>
           </a:p>
         </p:txBody>
       </p:sp>
@@ -4941,7 +4966,28 @@
           <a:bodyPr/>
           <a:lstStyle/>
           <a:p>
-            <a:endParaRPr lang="pt-BR"/>
+            <a:r>
+              <a:rPr lang="pt-BR" dirty="0"/>
+              <a:t>O desenvolvimento deste trabalho proporcionou um grande aprendizado e aplicação dos conhecimentos obtidos dentro e fora da graduação.</a:t>
+            </a:r>
+          </a:p>
+          <a:p>
+            <a:r>
+              <a:rPr lang="pt-BR" dirty="0"/>
+              <a:t>Inicialmente foi pensado em um sistema para o reconhecimento facial para acesso de moradores a residências visando o aumento na segurança, posteriormente foi revelado um outro fator crucial que é a rastreabilidade de acesso dos moradores.</a:t>
+            </a:r>
+          </a:p>
+          <a:p>
+            <a:r>
+              <a:rPr lang="pt-BR" dirty="0"/>
+              <a:t>Através do uso de tecnologias heterogêneas foi possível integrar um sistema de múltiplas partes para oferecer a possiblidade de acesso a residência através do reconhecimento facial, porém inserindo novas possibilidades.</a:t>
+            </a:r>
+          </a:p>
+          <a:p>
+            <a:r>
+              <a:rPr lang="pt-BR" dirty="0"/>
+              <a:t>Os objetivos principais foram atingidos na entrega deste trabalho, através do desenvolvimento de uma aplicação capaz de reconhecer e permitir o acesso de moradores a residência por meio da face e também do cartão RFID.</a:t>
+            </a:r>
           </a:p>
         </p:txBody>
       </p:sp>
@@ -4998,7 +5044,7 @@
           <a:p>
             <a:r>
               <a:rPr lang="pt-BR" dirty="0"/>
-              <a:t>referencias</a:t>
+              <a:t>referências</a:t>
             </a:r>
           </a:p>
         </p:txBody>

</xml_diff>

<commit_message>
fix: insercao do link do vídeo para última entrega, ajustes na apresentacao
</commit_message>
<xml_diff>
--- a/apresentacao/Meetscan.pptx
+++ b/apresentacao/Meetscan.pptx
@@ -521,7 +521,7 @@
           <a:p>
             <a:fld id="{08A8DB17-AA2F-4756-85B9-D2F6AB579BE1}" type="datetimeFigureOut">
               <a:rPr lang="pt-BR" smtClean="0"/>
-              <a:t>05/06/2024</a:t>
+              <a:t>06/06/2024</a:t>
             </a:fld>
             <a:endParaRPr lang="pt-BR"/>
           </a:p>
@@ -700,7 +700,7 @@
           <a:p>
             <a:fld id="{08A8DB17-AA2F-4756-85B9-D2F6AB579BE1}" type="datetimeFigureOut">
               <a:rPr lang="pt-BR" smtClean="0"/>
-              <a:t>05/06/2024</a:t>
+              <a:t>06/06/2024</a:t>
             </a:fld>
             <a:endParaRPr lang="pt-BR"/>
           </a:p>
@@ -880,7 +880,7 @@
           <a:p>
             <a:fld id="{08A8DB17-AA2F-4756-85B9-D2F6AB579BE1}" type="datetimeFigureOut">
               <a:rPr lang="pt-BR" smtClean="0"/>
-              <a:t>05/06/2024</a:t>
+              <a:t>06/06/2024</a:t>
             </a:fld>
             <a:endParaRPr lang="pt-BR"/>
           </a:p>
@@ -1050,7 +1050,7 @@
           <a:p>
             <a:fld id="{08A8DB17-AA2F-4756-85B9-D2F6AB579BE1}" type="datetimeFigureOut">
               <a:rPr lang="pt-BR" smtClean="0"/>
-              <a:t>05/06/2024</a:t>
+              <a:t>06/06/2024</a:t>
             </a:fld>
             <a:endParaRPr lang="pt-BR"/>
           </a:p>
@@ -1363,7 +1363,7 @@
           <a:p>
             <a:fld id="{08A8DB17-AA2F-4756-85B9-D2F6AB579BE1}" type="datetimeFigureOut">
               <a:rPr lang="pt-BR" smtClean="0"/>
-              <a:t>05/06/2024</a:t>
+              <a:t>06/06/2024</a:t>
             </a:fld>
             <a:endParaRPr lang="pt-BR"/>
           </a:p>
@@ -1749,7 +1749,7 @@
           <a:p>
             <a:fld id="{08A8DB17-AA2F-4756-85B9-D2F6AB579BE1}" type="datetimeFigureOut">
               <a:rPr lang="pt-BR" smtClean="0"/>
-              <a:t>05/06/2024</a:t>
+              <a:t>06/06/2024</a:t>
             </a:fld>
             <a:endParaRPr lang="pt-BR"/>
           </a:p>
@@ -2183,7 +2183,7 @@
           <a:p>
             <a:fld id="{08A8DB17-AA2F-4756-85B9-D2F6AB579BE1}" type="datetimeFigureOut">
               <a:rPr lang="pt-BR" smtClean="0"/>
-              <a:t>05/06/2024</a:t>
+              <a:t>06/06/2024</a:t>
             </a:fld>
             <a:endParaRPr lang="pt-BR"/>
           </a:p>
@@ -2301,7 +2301,7 @@
           <a:p>
             <a:fld id="{08A8DB17-AA2F-4756-85B9-D2F6AB579BE1}" type="datetimeFigureOut">
               <a:rPr lang="pt-BR" smtClean="0"/>
-              <a:t>05/06/2024</a:t>
+              <a:t>06/06/2024</a:t>
             </a:fld>
             <a:endParaRPr lang="pt-BR"/>
           </a:p>
@@ -2396,7 +2396,7 @@
           <a:p>
             <a:fld id="{08A8DB17-AA2F-4756-85B9-D2F6AB579BE1}" type="datetimeFigureOut">
               <a:rPr lang="pt-BR" smtClean="0"/>
-              <a:t>05/06/2024</a:t>
+              <a:t>06/06/2024</a:t>
             </a:fld>
             <a:endParaRPr lang="pt-BR"/>
           </a:p>
@@ -2746,7 +2746,7 @@
           <a:p>
             <a:fld id="{08A8DB17-AA2F-4756-85B9-D2F6AB579BE1}" type="datetimeFigureOut">
               <a:rPr lang="pt-BR" smtClean="0"/>
-              <a:t>05/06/2024</a:t>
+              <a:t>06/06/2024</a:t>
             </a:fld>
             <a:endParaRPr lang="pt-BR"/>
           </a:p>
@@ -3171,7 +3171,7 @@
           <a:p>
             <a:fld id="{08A8DB17-AA2F-4756-85B9-D2F6AB579BE1}" type="datetimeFigureOut">
               <a:rPr lang="pt-BR" smtClean="0"/>
-              <a:t>05/06/2024</a:t>
+              <a:t>06/06/2024</a:t>
             </a:fld>
             <a:endParaRPr lang="pt-BR"/>
           </a:p>
@@ -3452,7 +3452,7 @@
           <a:p>
             <a:fld id="{08A8DB17-AA2F-4756-85B9-D2F6AB579BE1}" type="datetimeFigureOut">
               <a:rPr lang="pt-BR" smtClean="0"/>
-              <a:t>05/06/2024</a:t>
+              <a:t>06/06/2024</a:t>
             </a:fld>
             <a:endParaRPr lang="pt-BR"/>
           </a:p>
@@ -4182,7 +4182,7 @@
             </a:r>
             <a:r>
               <a:rPr lang="pt-BR" dirty="0"/>
-              <a:t> foi pensado para proporcionar uma maneira de acesso a residências promovendo a rastreabilidade;</a:t>
+              <a:t> foi pensado para proporcionar uma maneira de acesso a residências utilizando o reconhecimento facial;</a:t>
             </a:r>
           </a:p>
           <a:p>
@@ -4554,6 +4554,36 @@
           </a:prstGeom>
         </p:spPr>
       </p:pic>
+      <p:pic>
+        <p:nvPicPr>
+          <p:cNvPr id="6" name="Imagem 5">
+            <a:extLst>
+              <a:ext uri="{FF2B5EF4-FFF2-40B4-BE49-F238E27FC236}">
+                <a16:creationId xmlns:a16="http://schemas.microsoft.com/office/drawing/2014/main" id="{2D08F9C4-5E94-AA9D-5892-686A53915E14}"/>
+              </a:ext>
+            </a:extLst>
+          </p:cNvPr>
+          <p:cNvPicPr>
+            <a:picLocks noChangeAspect="1"/>
+          </p:cNvPicPr>
+          <p:nvPr/>
+        </p:nvPicPr>
+        <p:blipFill>
+          <a:blip r:embed="rId10"/>
+          <a:stretch>
+            <a:fillRect/>
+          </a:stretch>
+        </p:blipFill>
+        <p:spPr>
+          <a:xfrm>
+            <a:off x="1378428" y="4166052"/>
+            <a:ext cx="1486107" cy="457264"/>
+          </a:xfrm>
+          <a:prstGeom prst="rect">
+            <a:avLst/>
+          </a:prstGeom>
+        </p:spPr>
+      </p:pic>
     </p:spTree>
     <p:extLst>
       <p:ext uri="{BB962C8B-B14F-4D97-AF65-F5344CB8AC3E}">
@@ -5068,268 +5098,356 @@
         <p:spPr/>
         <p:txBody>
           <a:bodyPr>
-            <a:normAutofit fontScale="85000" lnSpcReduction="20000"/>
+            <a:normAutofit fontScale="92500" lnSpcReduction="10000"/>
           </a:bodyPr>
           <a:lstStyle/>
           <a:p>
             <a:r>
-              <a:rPr lang="pt-BR" dirty="0"/>
+              <a:rPr lang="pt-BR" sz="1600" dirty="0"/>
               <a:t>BOOTSTRAP. </a:t>
             </a:r>
             <a:r>
-              <a:rPr lang="pt-BR" dirty="0" err="1"/>
+              <a:rPr lang="pt-BR" sz="1600" dirty="0" err="1"/>
               <a:t>Get</a:t>
             </a:r>
             <a:r>
-              <a:rPr lang="pt-BR" dirty="0"/>
+              <a:rPr lang="pt-BR" sz="1600" dirty="0"/>
               <a:t> </a:t>
             </a:r>
             <a:r>
-              <a:rPr lang="pt-BR" dirty="0" err="1"/>
+              <a:rPr lang="pt-BR" sz="1600" dirty="0" err="1"/>
               <a:t>bootstrap</a:t>
             </a:r>
             <a:r>
-              <a:rPr lang="pt-BR" dirty="0"/>
+              <a:rPr lang="pt-BR" sz="1600" dirty="0"/>
               <a:t>. Disponível em: &lt;</a:t>
             </a:r>
             <a:r>
-              <a:rPr lang="en-US" dirty="0">
+              <a:rPr lang="en-US" sz="1600" dirty="0">
                 <a:hlinkClick r:id="rId2"/>
               </a:rPr>
               <a:t>Bootstrap · The most popular HTML, CSS, and JS library in the world. (getbootstrap.com)</a:t>
             </a:r>
             <a:r>
-              <a:rPr lang="pt-BR" dirty="0"/>
+              <a:rPr lang="pt-BR" sz="1600" dirty="0"/>
               <a:t>&gt;. Acesso em: jun. 2024.</a:t>
             </a:r>
           </a:p>
           <a:p>
             <a:r>
-              <a:rPr lang="pt-BR" dirty="0"/>
+              <a:rPr lang="pt-BR" sz="1600" dirty="0"/>
               <a:t>C++. C++ Logo. Disponível em: &lt;</a:t>
             </a:r>
             <a:r>
-              <a:rPr lang="pt-BR" dirty="0" err="1">
+              <a:rPr lang="pt-BR" sz="1600" dirty="0" err="1">
                 <a:hlinkClick r:id="rId3"/>
               </a:rPr>
               <a:t>isocpp</a:t>
             </a:r>
             <a:r>
-              <a:rPr lang="pt-BR" dirty="0">
+              <a:rPr lang="pt-BR" sz="1600" dirty="0">
                 <a:hlinkClick r:id="rId3"/>
               </a:rPr>
               <a:t>/logos: C++ logos </a:t>
             </a:r>
             <a:r>
-              <a:rPr lang="pt-BR" dirty="0" err="1">
+              <a:rPr lang="pt-BR" sz="1600" dirty="0" err="1">
                 <a:hlinkClick r:id="rId3"/>
               </a:rPr>
               <a:t>created</a:t>
             </a:r>
             <a:r>
-              <a:rPr lang="pt-BR" dirty="0">
+              <a:rPr lang="pt-BR" sz="1600" dirty="0">
                 <a:hlinkClick r:id="rId3"/>
               </a:rPr>
               <a:t> for isocpp.org (github.com)</a:t>
             </a:r>
             <a:r>
-              <a:rPr lang="pt-BR" dirty="0"/>
+              <a:rPr lang="pt-BR" sz="1600" dirty="0"/>
               <a:t>&gt;. Acesso em: jun. 2024.</a:t>
             </a:r>
           </a:p>
           <a:p>
             <a:r>
-              <a:rPr lang="pt-BR" dirty="0"/>
-              <a:t>FLATICON. HTML </a:t>
-            </a:r>
-            <a:r>
-              <a:rPr lang="pt-BR" dirty="0" err="1"/>
-              <a:t>Icon</a:t>
-            </a:r>
-            <a:r>
-              <a:rPr lang="pt-BR" dirty="0"/>
-              <a:t>. Disponível em: &lt;</a:t>
-            </a:r>
-            <a:r>
-              <a:rPr lang="pt-BR" dirty="0" err="1">
+              <a:rPr lang="pt-BR" sz="1600" dirty="0"/>
+              <a:t>FIREBASE. Make </a:t>
+            </a:r>
+            <a:r>
+              <a:rPr lang="pt-BR" sz="1600" dirty="0" err="1"/>
+              <a:t>your</a:t>
+            </a:r>
+            <a:r>
+              <a:rPr lang="pt-BR" sz="1600" dirty="0"/>
+              <a:t> app </a:t>
+            </a:r>
+            <a:r>
+              <a:rPr lang="pt-BR" sz="1600" dirty="0" err="1"/>
+              <a:t>the</a:t>
+            </a:r>
+            <a:r>
+              <a:rPr lang="pt-BR" sz="1600" dirty="0"/>
+              <a:t> </a:t>
+            </a:r>
+            <a:r>
+              <a:rPr lang="pt-BR" sz="1600" dirty="0" err="1"/>
+              <a:t>best</a:t>
+            </a:r>
+            <a:r>
+              <a:rPr lang="pt-BR" sz="1600" dirty="0"/>
+              <a:t> it </a:t>
+            </a:r>
+            <a:r>
+              <a:rPr lang="pt-BR" sz="1600" dirty="0" err="1"/>
+              <a:t>can</a:t>
+            </a:r>
+            <a:r>
+              <a:rPr lang="pt-BR" sz="1600" dirty="0"/>
+              <a:t> </a:t>
+            </a:r>
+            <a:r>
+              <a:rPr lang="pt-BR" sz="1600" dirty="0" err="1"/>
+              <a:t>be</a:t>
+            </a:r>
+            <a:r>
+              <a:rPr lang="pt-BR" sz="1600" dirty="0"/>
+              <a:t> </a:t>
+            </a:r>
+            <a:r>
+              <a:rPr lang="pt-BR" sz="1600" dirty="0" err="1"/>
+              <a:t>with</a:t>
+            </a:r>
+            <a:r>
+              <a:rPr lang="pt-BR" sz="1600" dirty="0"/>
+              <a:t> </a:t>
+            </a:r>
+            <a:r>
+              <a:rPr lang="pt-BR" sz="1600" dirty="0" err="1"/>
+              <a:t>Firebase</a:t>
+            </a:r>
+            <a:r>
+              <a:rPr lang="pt-BR" sz="1600" dirty="0"/>
+              <a:t> </a:t>
+            </a:r>
+            <a:r>
+              <a:rPr lang="pt-BR" sz="1600" dirty="0" err="1"/>
+              <a:t>and</a:t>
+            </a:r>
+            <a:r>
+              <a:rPr lang="pt-BR" sz="1600" dirty="0"/>
+              <a:t> </a:t>
+            </a:r>
+            <a:r>
+              <a:rPr lang="pt-BR" sz="1600" dirty="0" err="1"/>
+              <a:t>generative</a:t>
+            </a:r>
+            <a:r>
+              <a:rPr lang="pt-BR" sz="1600" dirty="0"/>
+              <a:t> AI. Disponível em: &lt;</a:t>
+            </a:r>
+            <a:r>
+              <a:rPr lang="en-US" sz="1600" dirty="0">
                 <a:hlinkClick r:id="rId4"/>
               </a:rPr>
+              <a:t>Firebase | Google's Mobile and Web App Development Platform</a:t>
+            </a:r>
+            <a:r>
+              <a:rPr lang="pt-BR" sz="1600" dirty="0"/>
+              <a:t>&gt;. Acesso em: jun. 2024.</a:t>
+            </a:r>
+          </a:p>
+          <a:p>
+            <a:r>
+              <a:rPr lang="pt-BR" sz="1600" dirty="0"/>
+              <a:t>FLATICON. HTML </a:t>
+            </a:r>
+            <a:r>
+              <a:rPr lang="pt-BR" sz="1600" dirty="0" err="1"/>
+              <a:t>Icon</a:t>
+            </a:r>
+            <a:r>
+              <a:rPr lang="pt-BR" sz="1600" dirty="0"/>
+              <a:t>. Disponível em: &lt;</a:t>
+            </a:r>
+            <a:r>
+              <a:rPr lang="pt-BR" sz="1600" dirty="0" err="1">
+                <a:hlinkClick r:id="rId5"/>
+              </a:rPr>
               <a:t>Html</a:t>
             </a:r>
             <a:r>
-              <a:rPr lang="pt-BR" dirty="0">
-                <a:hlinkClick r:id="rId4"/>
+              <a:rPr lang="pt-BR" sz="1600" dirty="0">
+                <a:hlinkClick r:id="rId5"/>
               </a:rPr>
               <a:t> 5 - Free social media </a:t>
             </a:r>
             <a:r>
-              <a:rPr lang="pt-BR" dirty="0" err="1">
-                <a:hlinkClick r:id="rId4"/>
+              <a:rPr lang="pt-BR" sz="1600" dirty="0" err="1">
+                <a:hlinkClick r:id="rId5"/>
               </a:rPr>
               <a:t>icons</a:t>
             </a:r>
             <a:r>
-              <a:rPr lang="pt-BR" dirty="0">
-                <a:hlinkClick r:id="rId4"/>
-              </a:rPr>
-              <a:t> (flaticon.com)</a:t>
-            </a:r>
-            <a:r>
-              <a:rPr lang="pt-BR" dirty="0"/>
-              <a:t>&gt;. Acesso em: jun. 2024.</a:t>
-            </a:r>
-          </a:p>
-          <a:p>
-            <a:r>
-              <a:rPr lang="pt-BR" dirty="0"/>
-              <a:t>FLATICON. TELEGRAM </a:t>
-            </a:r>
-            <a:r>
-              <a:rPr lang="pt-BR" dirty="0" err="1"/>
-              <a:t>Icon</a:t>
-            </a:r>
-            <a:r>
-              <a:rPr lang="pt-BR" dirty="0"/>
-              <a:t>. Disponível em: &lt;</a:t>
-            </a:r>
-            <a:r>
-              <a:rPr lang="pt-BR" dirty="0">
-                <a:hlinkClick r:id="rId5"/>
-              </a:rPr>
-              <a:t>Telegram </a:t>
-            </a:r>
-            <a:r>
-              <a:rPr lang="pt-BR" dirty="0" err="1">
-                <a:hlinkClick r:id="rId5"/>
-              </a:rPr>
-              <a:t>Icons</a:t>
-            </a:r>
-            <a:r>
-              <a:rPr lang="pt-BR" dirty="0">
-                <a:hlinkClick r:id="rId5"/>
-              </a:rPr>
-              <a:t> &amp; </a:t>
-            </a:r>
-            <a:r>
-              <a:rPr lang="pt-BR" dirty="0" err="1">
-                <a:hlinkClick r:id="rId5"/>
-              </a:rPr>
-              <a:t>Symbols</a:t>
-            </a:r>
-            <a:r>
-              <a:rPr lang="pt-BR" dirty="0">
+              <a:rPr lang="pt-BR" sz="1600" dirty="0">
                 <a:hlinkClick r:id="rId5"/>
               </a:rPr>
               <a:t> (flaticon.com)</a:t>
             </a:r>
             <a:r>
-              <a:rPr lang="pt-BR" dirty="0"/>
+              <a:rPr lang="pt-BR" sz="1600" dirty="0"/>
               <a:t>&gt;. Acesso em: jun. 2024.</a:t>
             </a:r>
           </a:p>
           <a:p>
             <a:r>
-              <a:rPr lang="pt-BR" dirty="0"/>
-              <a:t>JQUERY. </a:t>
-            </a:r>
-            <a:r>
-              <a:rPr lang="pt-BR" dirty="0" err="1"/>
-              <a:t>Jquery</a:t>
-            </a:r>
-            <a:r>
-              <a:rPr lang="pt-BR" dirty="0"/>
-              <a:t> brand. Disponível em: &lt;</a:t>
-            </a:r>
-            <a:r>
-              <a:rPr lang="pt-BR" dirty="0">
+              <a:rPr lang="pt-BR" sz="1600" dirty="0"/>
+              <a:t>FLATICON. TELEGRAM </a:t>
+            </a:r>
+            <a:r>
+              <a:rPr lang="pt-BR" sz="1600" dirty="0" err="1"/>
+              <a:t>Icon</a:t>
+            </a:r>
+            <a:r>
+              <a:rPr lang="pt-BR" sz="1600" dirty="0"/>
+              <a:t>. Disponível em: &lt;</a:t>
+            </a:r>
+            <a:r>
+              <a:rPr lang="pt-BR" sz="1600" dirty="0">
                 <a:hlinkClick r:id="rId6"/>
               </a:rPr>
-              <a:t>Logos | </a:t>
-            </a:r>
-            <a:r>
-              <a:rPr lang="pt-BR" dirty="0" err="1">
+              <a:t>Telegram </a:t>
+            </a:r>
+            <a:r>
+              <a:rPr lang="pt-BR" sz="1600" dirty="0" err="1">
                 <a:hlinkClick r:id="rId6"/>
               </a:rPr>
-              <a:t>jQuery</a:t>
-            </a:r>
-            <a:r>
-              <a:rPr lang="pt-BR" dirty="0">
+              <a:t>Icons</a:t>
+            </a:r>
+            <a:r>
+              <a:rPr lang="pt-BR" sz="1600" dirty="0">
                 <a:hlinkClick r:id="rId6"/>
               </a:rPr>
-              <a:t> Brand </a:t>
-            </a:r>
-            <a:r>
-              <a:rPr lang="pt-BR" dirty="0" err="1">
+              <a:t> &amp; </a:t>
+            </a:r>
+            <a:r>
+              <a:rPr lang="pt-BR" sz="1600" dirty="0" err="1">
                 <a:hlinkClick r:id="rId6"/>
               </a:rPr>
-              <a:t>Guidelines</a:t>
-            </a:r>
-            <a:r>
-              <a:rPr lang="pt-BR" dirty="0"/>
+              <a:t>Symbols</a:t>
+            </a:r>
+            <a:r>
+              <a:rPr lang="pt-BR" sz="1600" dirty="0">
+                <a:hlinkClick r:id="rId6"/>
+              </a:rPr>
+              <a:t> (flaticon.com)</a:t>
+            </a:r>
+            <a:r>
+              <a:rPr lang="pt-BR" sz="1600" dirty="0"/>
               <a:t>&gt;. Acesso em: jun. 2024.</a:t>
             </a:r>
           </a:p>
           <a:p>
             <a:r>
-              <a:rPr lang="pt-BR" dirty="0"/>
-              <a:t>Laravel. Laravel. Disponível em: &lt;</a:t>
-            </a:r>
-            <a:r>
-              <a:rPr lang="en-US" dirty="0">
+              <a:rPr lang="pt-BR" sz="1600" dirty="0"/>
+              <a:t>JQUERY. </a:t>
+            </a:r>
+            <a:r>
+              <a:rPr lang="pt-BR" sz="1600" dirty="0" err="1"/>
+              <a:t>Jquery</a:t>
+            </a:r>
+            <a:r>
+              <a:rPr lang="pt-BR" sz="1600" dirty="0"/>
+              <a:t> brand. Disponível em: &lt;</a:t>
+            </a:r>
+            <a:r>
+              <a:rPr lang="pt-BR" sz="1600" dirty="0">
                 <a:hlinkClick r:id="rId7"/>
               </a:rPr>
-              <a:t>Laravel - The PHP Framework For Web Artisans</a:t>
-            </a:r>
-            <a:r>
-              <a:rPr lang="pt-BR" dirty="0"/>
+              <a:t>Logos | </a:t>
+            </a:r>
+            <a:r>
+              <a:rPr lang="pt-BR" sz="1600" dirty="0" err="1">
+                <a:hlinkClick r:id="rId7"/>
+              </a:rPr>
+              <a:t>jQuery</a:t>
+            </a:r>
+            <a:r>
+              <a:rPr lang="pt-BR" sz="1600" dirty="0">
+                <a:hlinkClick r:id="rId7"/>
+              </a:rPr>
+              <a:t> Brand </a:t>
+            </a:r>
+            <a:r>
+              <a:rPr lang="pt-BR" sz="1600" dirty="0" err="1">
+                <a:hlinkClick r:id="rId7"/>
+              </a:rPr>
+              <a:t>Guidelines</a:t>
+            </a:r>
+            <a:r>
+              <a:rPr lang="pt-BR" sz="1600" dirty="0"/>
               <a:t>&gt;. Acesso em: jun. 2024.</a:t>
             </a:r>
           </a:p>
           <a:p>
             <a:r>
-              <a:rPr lang="pt-BR" dirty="0"/>
-              <a:t>MYSQL. MySQL logo. Disponível em: &lt;</a:t>
-            </a:r>
-            <a:r>
-              <a:rPr lang="pt-BR" dirty="0">
+              <a:rPr lang="pt-BR" sz="1600" dirty="0"/>
+              <a:t>Laravel. Laravel. Disponível em: &lt;</a:t>
+            </a:r>
+            <a:r>
+              <a:rPr lang="en-US" sz="1600" dirty="0">
                 <a:hlinkClick r:id="rId8"/>
               </a:rPr>
-              <a:t>MySQL :: MySQL Logo Downloads</a:t>
-            </a:r>
-            <a:r>
-              <a:rPr lang="pt-BR" dirty="0"/>
+              <a:t>Laravel - The PHP Framework For Web Artisans</a:t>
+            </a:r>
+            <a:r>
+              <a:rPr lang="pt-BR" sz="1600" dirty="0"/>
               <a:t>&gt;. Acesso em: jun. 2024.</a:t>
             </a:r>
           </a:p>
           <a:p>
             <a:r>
-              <a:rPr lang="pt-BR" dirty="0"/>
-              <a:t>PHP. PHP logos. Disponível em: &lt;</a:t>
-            </a:r>
-            <a:r>
-              <a:rPr lang="pt-BR" dirty="0">
+              <a:rPr lang="pt-BR" sz="1600" dirty="0"/>
+              <a:t>MYSQL. MySQL logo. Disponível em: &lt;</a:t>
+            </a:r>
+            <a:r>
+              <a:rPr lang="pt-BR" sz="1600" dirty="0">
                 <a:hlinkClick r:id="rId9"/>
               </a:rPr>
-              <a:t>PHP: Download Logos</a:t>
-            </a:r>
-            <a:r>
-              <a:rPr lang="pt-BR" dirty="0"/>
+              <a:t>MySQL :: MySQL Logo Downloads</a:t>
+            </a:r>
+            <a:r>
+              <a:rPr lang="pt-BR" sz="1600" dirty="0"/>
               <a:t>&gt;. Acesso em: jun. 2024.</a:t>
             </a:r>
           </a:p>
           <a:p>
             <a:r>
-              <a:rPr lang="pt-BR" dirty="0"/>
-              <a:t>PYTHON. Python logo. Disponível em: &lt;</a:t>
-            </a:r>
-            <a:r>
-              <a:rPr lang="en-US" dirty="0">
+              <a:rPr lang="pt-BR" sz="1600" dirty="0"/>
+              <a:t>PHP. PHP logos. Disponível em: &lt;</a:t>
+            </a:r>
+            <a:r>
+              <a:rPr lang="pt-BR" sz="1600" dirty="0">
                 <a:hlinkClick r:id="rId10"/>
               </a:rPr>
+              <a:t>PHP: Download Logos</a:t>
+            </a:r>
+            <a:r>
+              <a:rPr lang="pt-BR" sz="1600" dirty="0"/>
+              <a:t>&gt;. Acesso em: jun. 2024.</a:t>
+            </a:r>
+          </a:p>
+          <a:p>
+            <a:r>
+              <a:rPr lang="pt-BR" sz="1600" dirty="0"/>
+              <a:t>PYTHON. Python logo. Disponível em: &lt;</a:t>
+            </a:r>
+            <a:r>
+              <a:rPr lang="en-US" sz="1600" dirty="0">
+                <a:hlinkClick r:id="rId11"/>
+              </a:rPr>
               <a:t>The Python Logo | Python Software Foundation</a:t>
             </a:r>
             <a:r>
-              <a:rPr lang="pt-BR" dirty="0"/>
+              <a:rPr lang="pt-BR" sz="1600" dirty="0"/>
               <a:t>&gt;. Acesso em: jun. 2024.</a:t>
             </a:r>
           </a:p>

</xml_diff>